<commit_message>
Max Sections Allowed Rule Condition
</commit_message>
<xml_diff>
--- a/Rule your solutions.pptx
+++ b/Rule your solutions.pptx
@@ -577,6 +577,215 @@
     <p:extLst>
       <p:ext uri="{BB962C8B-B14F-4D97-AF65-F5344CB8AC3E}">
         <p14:creationId xmlns:p14="http://schemas.microsoft.com/office/powerpoint/2010/main" val="1165465512"/>
+      </p:ext>
+    </p:extLst>
+  </p:cSld>
+  <p:clrMapOvr>
+    <a:masterClrMapping/>
+  </p:clrMapOvr>
+</p:notes>
+</file>
+
+<file path=ppt/notesSlides/notesSlide2.xml><?xml version="1.0" encoding="utf-8"?>
+<p:notes xmlns:a="http://schemas.openxmlformats.org/drawingml/2006/main" xmlns:r="http://schemas.openxmlformats.org/officeDocument/2006/relationships" xmlns:p="http://schemas.openxmlformats.org/presentationml/2006/main">
+  <p:cSld>
+    <p:spTree>
+      <p:nvGrpSpPr>
+        <p:cNvPr id="1" name=""/>
+        <p:cNvGrpSpPr/>
+        <p:nvPr/>
+      </p:nvGrpSpPr>
+      <p:grpSpPr>
+        <a:xfrm>
+          <a:off x="0" y="0"/>
+          <a:ext cx="0" cy="0"/>
+          <a:chOff x="0" y="0"/>
+          <a:chExt cx="0" cy="0"/>
+        </a:xfrm>
+      </p:grpSpPr>
+      <p:sp>
+        <p:nvSpPr>
+          <p:cNvPr id="2" name="Slide Image Placeholder 1"/>
+          <p:cNvSpPr>
+            <a:spLocks noGrp="1" noRot="1" noChangeAspect="1"/>
+          </p:cNvSpPr>
+          <p:nvPr>
+            <p:ph type="sldImg"/>
+          </p:nvPr>
+        </p:nvSpPr>
+        <p:spPr/>
+      </p:sp>
+      <p:sp>
+        <p:nvSpPr>
+          <p:cNvPr id="3" name="Notes Placeholder 2"/>
+          <p:cNvSpPr>
+            <a:spLocks noGrp="1"/>
+          </p:cNvSpPr>
+          <p:nvPr>
+            <p:ph type="body" idx="1"/>
+          </p:nvPr>
+        </p:nvSpPr>
+        <p:spPr/>
+        <p:txBody>
+          <a:bodyPr/>
+          <a:lstStyle/>
+          <a:p>
+            <a:r>
+              <a:rPr lang="en-GB" dirty="0" err="1" smtClean="0"/>
+              <a:t>Sitecore</a:t>
+            </a:r>
+            <a:r>
+              <a:rPr lang="en-GB" dirty="0" smtClean="0"/>
+              <a:t> -&gt; System -&gt; Settings -&gt; Rules -&gt;</a:t>
+            </a:r>
+            <a:r>
+              <a:rPr lang="en-GB" baseline="0" dirty="0" smtClean="0"/>
+              <a:t> Insert Options</a:t>
+            </a:r>
+            <a:endParaRPr lang="en-GB" dirty="0"/>
+          </a:p>
+        </p:txBody>
+      </p:sp>
+      <p:sp>
+        <p:nvSpPr>
+          <p:cNvPr id="4" name="Slide Number Placeholder 3"/>
+          <p:cNvSpPr>
+            <a:spLocks noGrp="1"/>
+          </p:cNvSpPr>
+          <p:nvPr>
+            <p:ph type="sldNum" sz="quarter" idx="10"/>
+          </p:nvPr>
+        </p:nvSpPr>
+        <p:spPr/>
+        <p:txBody>
+          <a:bodyPr/>
+          <a:lstStyle/>
+          <a:p>
+            <a:fld id="{6FE02C74-E09A-4BCB-A5F4-476E0F06F59A}" type="slidenum">
+              <a:rPr lang="en-GB" smtClean="0"/>
+              <a:t>8</a:t>
+            </a:fld>
+            <a:endParaRPr lang="en-GB"/>
+          </a:p>
+        </p:txBody>
+      </p:sp>
+    </p:spTree>
+    <p:extLst>
+      <p:ext uri="{BB962C8B-B14F-4D97-AF65-F5344CB8AC3E}">
+        <p14:creationId xmlns:p14="http://schemas.microsoft.com/office/powerpoint/2010/main" val="995787915"/>
+      </p:ext>
+    </p:extLst>
+  </p:cSld>
+  <p:clrMapOvr>
+    <a:masterClrMapping/>
+  </p:clrMapOvr>
+</p:notes>
+</file>
+
+<file path=ppt/notesSlides/notesSlide3.xml><?xml version="1.0" encoding="utf-8"?>
+<p:notes xmlns:a="http://schemas.openxmlformats.org/drawingml/2006/main" xmlns:r="http://schemas.openxmlformats.org/officeDocument/2006/relationships" xmlns:p="http://schemas.openxmlformats.org/presentationml/2006/main">
+  <p:cSld>
+    <p:spTree>
+      <p:nvGrpSpPr>
+        <p:cNvPr id="1" name=""/>
+        <p:cNvGrpSpPr/>
+        <p:nvPr/>
+      </p:nvGrpSpPr>
+      <p:grpSpPr>
+        <a:xfrm>
+          <a:off x="0" y="0"/>
+          <a:ext cx="0" cy="0"/>
+          <a:chOff x="0" y="0"/>
+          <a:chExt cx="0" cy="0"/>
+        </a:xfrm>
+      </p:grpSpPr>
+      <p:sp>
+        <p:nvSpPr>
+          <p:cNvPr id="2" name="Slide Image Placeholder 1"/>
+          <p:cNvSpPr>
+            <a:spLocks noGrp="1" noRot="1" noChangeAspect="1"/>
+          </p:cNvSpPr>
+          <p:nvPr>
+            <p:ph type="sldImg"/>
+          </p:nvPr>
+        </p:nvSpPr>
+        <p:spPr/>
+      </p:sp>
+      <p:sp>
+        <p:nvSpPr>
+          <p:cNvPr id="3" name="Notes Placeholder 2"/>
+          <p:cNvSpPr>
+            <a:spLocks noGrp="1"/>
+          </p:cNvSpPr>
+          <p:nvPr>
+            <p:ph type="body" idx="1"/>
+          </p:nvPr>
+        </p:nvSpPr>
+        <p:spPr/>
+        <p:txBody>
+          <a:bodyPr/>
+          <a:lstStyle/>
+          <a:p>
+            <a:r>
+              <a:rPr lang="en-GB" dirty="0" smtClean="0"/>
+              <a:t>/</a:t>
+            </a:r>
+            <a:r>
+              <a:rPr lang="en-GB" dirty="0" err="1" smtClean="0"/>
+              <a:t>sitecore</a:t>
+            </a:r>
+            <a:r>
+              <a:rPr lang="en-GB" dirty="0" smtClean="0"/>
+              <a:t>/system/Settings/Rules/Definitions/Elements/Insert Options/Sections Allowed</a:t>
+            </a:r>
+            <a:br>
+              <a:rPr lang="en-GB" dirty="0" smtClean="0"/>
+            </a:br>
+            <a:r>
+              <a:rPr lang="en-GB" dirty="0" smtClean="0"/>
+              <a:t>/</a:t>
+            </a:r>
+            <a:r>
+              <a:rPr lang="en-GB" dirty="0" err="1" smtClean="0"/>
+              <a:t>sitecore</a:t>
+            </a:r>
+            <a:r>
+              <a:rPr lang="en-GB" dirty="0" smtClean="0"/>
+              <a:t>/system/Settings/Rules/Insert Options/Rules</a:t>
+            </a:r>
+          </a:p>
+          <a:p>
+            <a:endParaRPr lang="en-GB" dirty="0"/>
+          </a:p>
+        </p:txBody>
+      </p:sp>
+      <p:sp>
+        <p:nvSpPr>
+          <p:cNvPr id="4" name="Slide Number Placeholder 3"/>
+          <p:cNvSpPr>
+            <a:spLocks noGrp="1"/>
+          </p:cNvSpPr>
+          <p:nvPr>
+            <p:ph type="sldNum" sz="quarter" idx="10"/>
+          </p:nvPr>
+        </p:nvSpPr>
+        <p:spPr/>
+        <p:txBody>
+          <a:bodyPr/>
+          <a:lstStyle/>
+          <a:p>
+            <a:fld id="{6FE02C74-E09A-4BCB-A5F4-476E0F06F59A}" type="slidenum">
+              <a:rPr lang="en-GB" smtClean="0"/>
+              <a:t>10</a:t>
+            </a:fld>
+            <a:endParaRPr lang="en-GB"/>
+          </a:p>
+        </p:txBody>
+      </p:sp>
+    </p:spTree>
+    <p:extLst>
+      <p:ext uri="{BB962C8B-B14F-4D97-AF65-F5344CB8AC3E}">
+        <p14:creationId xmlns:p14="http://schemas.microsoft.com/office/powerpoint/2010/main" val="426020143"/>
       </p:ext>
     </p:extLst>
   </p:cSld>
@@ -15181,8 +15390,34 @@
             </a:r>
             <a:r>
               <a:rPr lang="en-US" dirty="0" smtClean="0"/>
-              <a:t>&lt;T&gt;</a:t>
-            </a:r>
+              <a:t>&lt;T</a:t>
+            </a:r>
+            <a:r>
+              <a:rPr lang="en-US" dirty="0" smtClean="0"/>
+              <a:t>&gt;</a:t>
+            </a:r>
+          </a:p>
+          <a:p>
+            <a:r>
+              <a:rPr lang="en-US" dirty="0" smtClean="0"/>
+              <a:t>Achieves what we did before, but can now be combined with additional conditions</a:t>
+            </a:r>
+          </a:p>
+          <a:p>
+            <a:pPr lvl="1"/>
+            <a:r>
+              <a:rPr lang="en-US" dirty="0" smtClean="0"/>
+              <a:t>E.g. “if user is in role </a:t>
+            </a:r>
+            <a:r>
+              <a:rPr lang="en-US" u="sng" dirty="0" smtClean="0"/>
+              <a:t>Site Admins</a:t>
+            </a:r>
+            <a:r>
+              <a:rPr lang="en-US" dirty="0" smtClean="0"/>
+              <a:t> OR …”</a:t>
+            </a:r>
+            <a:endParaRPr lang="en-US" dirty="0" smtClean="0"/>
           </a:p>
           <a:p>
             <a:endParaRPr lang="da-DK" dirty="0"/>
@@ -15224,6 +15459,13 @@
   <p:clrMapOvr>
     <a:masterClrMapping/>
   </p:clrMapOvr>
+  <p:timing>
+    <p:tnLst>
+      <p:par>
+        <p:cTn id="1" dur="indefinite" restart="never" nodeType="tmRoot"/>
+      </p:par>
+    </p:tnLst>
+  </p:timing>
 </p:sld>
 </file>
 
@@ -15261,7 +15503,19 @@
           <a:p>
             <a:r>
               <a:rPr lang="en-US" dirty="0" smtClean="0"/>
-              <a:t>Make it configurable, how many Folder items are allowed</a:t>
+              <a:t>Make it configurable, how </a:t>
+            </a:r>
+            <a:r>
+              <a:rPr lang="en-US" smtClean="0"/>
+              <a:t>many </a:t>
+            </a:r>
+            <a:r>
+              <a:rPr lang="en-US" smtClean="0"/>
+              <a:t>Section items </a:t>
+            </a:r>
+            <a:r>
+              <a:rPr lang="en-US" dirty="0" smtClean="0"/>
+              <a:t>are allowed</a:t>
             </a:r>
           </a:p>
           <a:p>
@@ -15316,6 +15570,13 @@
   <p:clrMapOvr>
     <a:masterClrMapping/>
   </p:clrMapOvr>
+  <p:timing>
+    <p:tnLst>
+      <p:par>
+        <p:cTn id="1" dur="indefinite" restart="never" nodeType="tmRoot"/>
+      </p:par>
+    </p:tnLst>
+  </p:timing>
 </p:sld>
 </file>
 
@@ -16143,7 +16404,11 @@
           <a:p>
             <a:r>
               <a:rPr lang="en-US" dirty="0" smtClean="0"/>
-              <a:t>A brief overview</a:t>
+              <a:t>Rules Engine - A </a:t>
+            </a:r>
+            <a:r>
+              <a:rPr lang="en-US" dirty="0" smtClean="0"/>
+              <a:t>brief overview</a:t>
             </a:r>
             <a:endParaRPr lang="da-DK" dirty="0"/>
           </a:p>
@@ -16541,25 +16806,6 @@
       </p:grpSpPr>
       <p:sp>
         <p:nvSpPr>
-          <p:cNvPr id="2" name="Pladsholder til indhold 1"/>
-          <p:cNvSpPr>
-            <a:spLocks noGrp="1"/>
-          </p:cNvSpPr>
-          <p:nvPr>
-            <p:ph idx="1"/>
-          </p:nvPr>
-        </p:nvSpPr>
-        <p:spPr/>
-        <p:txBody>
-          <a:bodyPr/>
-          <a:lstStyle/>
-          <a:p>
-            <a:endParaRPr lang="da-DK"/>
-          </a:p>
-        </p:txBody>
-      </p:sp>
-      <p:sp>
-        <p:nvSpPr>
           <p:cNvPr id="3" name="Titel 2"/>
           <p:cNvSpPr>
             <a:spLocks noGrp="1"/>
@@ -16583,6 +16829,49 @@
           </a:p>
         </p:txBody>
       </p:sp>
+      <p:pic>
+        <p:nvPicPr>
+          <p:cNvPr id="2050" name="Picture 2" descr="https://media2.giphy.com/media/azA0igTLB8YJW/200.gif#194"/>
+          <p:cNvPicPr>
+            <a:picLocks noGrp="1" noChangeAspect="1" noChangeArrowheads="1" noCrop="1"/>
+          </p:cNvPicPr>
+          <p:nvPr>
+            <p:ph idx="1"/>
+          </p:nvPr>
+        </p:nvPicPr>
+        <p:blipFill>
+          <a:blip r:embed="rId3">
+            <a:extLst>
+              <a:ext uri="{28A0092B-C50C-407E-A947-70E740481C1C}">
+                <a14:useLocalDpi xmlns:a14="http://schemas.microsoft.com/office/drawing/2010/main" val="0"/>
+              </a:ext>
+            </a:extLst>
+          </a:blip>
+          <a:srcRect/>
+          <a:stretch>
+            <a:fillRect/>
+          </a:stretch>
+        </p:blipFill>
+        <p:spPr bwMode="auto">
+          <a:xfrm>
+            <a:off x="3304381" y="3448050"/>
+            <a:ext cx="2543175" cy="1905000"/>
+          </a:xfrm>
+          <a:prstGeom prst="rect">
+            <a:avLst/>
+          </a:prstGeom>
+          <a:noFill/>
+          <a:extLst>
+            <a:ext uri="{909E8E84-426E-40DD-AFC4-6F175D3DCCD1}">
+              <a14:hiddenFill xmlns:a14="http://schemas.microsoft.com/office/drawing/2010/main">
+                <a:solidFill>
+                  <a:srgbClr val="FFFFFF"/>
+                </a:solidFill>
+              </a14:hiddenFill>
+            </a:ext>
+          </a:extLst>
+        </p:spPr>
+      </p:pic>
     </p:spTree>
     <p:extLst>
       <p:ext uri="{BB962C8B-B14F-4D97-AF65-F5344CB8AC3E}">
@@ -16593,6 +16882,13 @@
   <p:clrMapOvr>
     <a:masterClrMapping/>
   </p:clrMapOvr>
+  <p:timing>
+    <p:tnLst>
+      <p:par>
+        <p:cTn id="1" dur="indefinite" restart="never" nodeType="tmRoot"/>
+      </p:par>
+    </p:tnLst>
+  </p:timing>
 </p:sld>
 </file>
 
@@ -16686,6 +16982,13 @@
   <p:clrMapOvr>
     <a:masterClrMapping/>
   </p:clrMapOvr>
+  <p:timing>
+    <p:tnLst>
+      <p:par>
+        <p:cTn id="1" dur="indefinite" restart="never" nodeType="tmRoot"/>
+      </p:par>
+    </p:tnLst>
+  </p:timing>
 </p:sld>
 </file>
 

</xml_diff>